<commit_message>
Added day 2 slides. Fixed errors on day 1 slide and added small clarification about using conditionals in dice plugin
</commit_message>
<xml_diff>
--- a/slides/ScriptCraft- Day 01 (Getting Started).pptx
+++ b/slides/ScriptCraft- Day 01 (Getting Started).pptx
@@ -3665,7 +3665,7 @@
   <p:cSld>
     <p:spTree>
       <p:nvGrpSpPr>
-        <p:cNvPr id="310" name="Shape 310"/>
+        <p:cNvPr id="311" name="Shape 311"/>
         <p:cNvGrpSpPr/>
         <p:nvPr/>
       </p:nvGrpSpPr>
@@ -3679,7 +3679,7 @@
       </p:grpSpPr>
       <p:sp>
         <p:nvSpPr>
-          <p:cNvPr id="311" name="Shape 311"/>
+          <p:cNvPr id="312" name="Shape 312"/>
           <p:cNvSpPr/>
           <p:nvPr>
             <p:ph idx="2" type="sldImg"/>
@@ -3713,7 +3713,7 @@
       </p:sp>
       <p:sp>
         <p:nvSpPr>
-          <p:cNvPr id="312" name="Shape 312"/>
+          <p:cNvPr id="313" name="Shape 313"/>
           <p:cNvSpPr txBox="1"/>
           <p:nvPr>
             <p:ph idx="1" type="body"/>
@@ -3760,7 +3760,7 @@
   <p:cSld>
     <p:spTree>
       <p:nvGrpSpPr>
-        <p:cNvPr id="315" name="Shape 315"/>
+        <p:cNvPr id="316" name="Shape 316"/>
         <p:cNvGrpSpPr/>
         <p:nvPr/>
       </p:nvGrpSpPr>
@@ -3774,7 +3774,7 @@
       </p:grpSpPr>
       <p:sp>
         <p:nvSpPr>
-          <p:cNvPr id="316" name="Shape 316"/>
+          <p:cNvPr id="317" name="Shape 317"/>
           <p:cNvSpPr/>
           <p:nvPr>
             <p:ph idx="2" type="sldImg"/>
@@ -3808,7 +3808,7 @@
       </p:sp>
       <p:sp>
         <p:nvSpPr>
-          <p:cNvPr id="317" name="Shape 317"/>
+          <p:cNvPr id="318" name="Shape 318"/>
           <p:cNvSpPr txBox="1"/>
           <p:nvPr>
             <p:ph idx="1" type="body"/>
@@ -3855,7 +3855,7 @@
   <p:cSld>
     <p:spTree>
       <p:nvGrpSpPr>
-        <p:cNvPr id="321" name="Shape 321"/>
+        <p:cNvPr id="322" name="Shape 322"/>
         <p:cNvGrpSpPr/>
         <p:nvPr/>
       </p:nvGrpSpPr>
@@ -3869,7 +3869,7 @@
       </p:grpSpPr>
       <p:sp>
         <p:nvSpPr>
-          <p:cNvPr id="322" name="Shape 322"/>
+          <p:cNvPr id="323" name="Shape 323"/>
           <p:cNvSpPr/>
           <p:nvPr>
             <p:ph idx="2" type="sldImg"/>
@@ -3903,7 +3903,7 @@
       </p:sp>
       <p:sp>
         <p:nvSpPr>
-          <p:cNvPr id="323" name="Shape 323"/>
+          <p:cNvPr id="324" name="Shape 324"/>
           <p:cNvSpPr txBox="1"/>
           <p:nvPr>
             <p:ph idx="1" type="body"/>
@@ -3950,7 +3950,7 @@
   <p:cSld>
     <p:spTree>
       <p:nvGrpSpPr>
-        <p:cNvPr id="327" name="Shape 327"/>
+        <p:cNvPr id="328" name="Shape 328"/>
         <p:cNvGrpSpPr/>
         <p:nvPr/>
       </p:nvGrpSpPr>
@@ -3964,7 +3964,7 @@
       </p:grpSpPr>
       <p:sp>
         <p:nvSpPr>
-          <p:cNvPr id="328" name="Shape 328"/>
+          <p:cNvPr id="329" name="Shape 329"/>
           <p:cNvSpPr/>
           <p:nvPr>
             <p:ph idx="2" type="sldImg"/>
@@ -3998,7 +3998,7 @@
       </p:sp>
       <p:sp>
         <p:nvSpPr>
-          <p:cNvPr id="329" name="Shape 329"/>
+          <p:cNvPr id="330" name="Shape 330"/>
           <p:cNvSpPr txBox="1"/>
           <p:nvPr>
             <p:ph idx="1" type="body"/>
@@ -4045,7 +4045,7 @@
   <p:cSld>
     <p:spTree>
       <p:nvGrpSpPr>
-        <p:cNvPr id="333" name="Shape 333"/>
+        <p:cNvPr id="334" name="Shape 334"/>
         <p:cNvGrpSpPr/>
         <p:nvPr/>
       </p:nvGrpSpPr>
@@ -4059,7 +4059,7 @@
       </p:grpSpPr>
       <p:sp>
         <p:nvSpPr>
-          <p:cNvPr id="334" name="Shape 334"/>
+          <p:cNvPr id="335" name="Shape 335"/>
           <p:cNvSpPr/>
           <p:nvPr>
             <p:ph idx="2" type="sldImg"/>
@@ -4093,7 +4093,7 @@
       </p:sp>
       <p:sp>
         <p:nvSpPr>
-          <p:cNvPr id="335" name="Shape 335"/>
+          <p:cNvPr id="336" name="Shape 336"/>
           <p:cNvSpPr txBox="1"/>
           <p:nvPr>
             <p:ph idx="1" type="body"/>
@@ -4140,7 +4140,7 @@
   <p:cSld>
     <p:spTree>
       <p:nvGrpSpPr>
-        <p:cNvPr id="340" name="Shape 340"/>
+        <p:cNvPr id="341" name="Shape 341"/>
         <p:cNvGrpSpPr/>
         <p:nvPr/>
       </p:nvGrpSpPr>
@@ -4154,7 +4154,7 @@
       </p:grpSpPr>
       <p:sp>
         <p:nvSpPr>
-          <p:cNvPr id="341" name="Shape 341"/>
+          <p:cNvPr id="342" name="Shape 342"/>
           <p:cNvSpPr/>
           <p:nvPr>
             <p:ph idx="2" type="sldImg"/>
@@ -4188,7 +4188,7 @@
       </p:sp>
       <p:sp>
         <p:nvSpPr>
-          <p:cNvPr id="342" name="Shape 342"/>
+          <p:cNvPr id="343" name="Shape 343"/>
           <p:cNvSpPr txBox="1"/>
           <p:nvPr>
             <p:ph idx="1" type="body"/>
@@ -4235,7 +4235,7 @@
   <p:cSld>
     <p:spTree>
       <p:nvGrpSpPr>
-        <p:cNvPr id="346" name="Shape 346"/>
+        <p:cNvPr id="347" name="Shape 347"/>
         <p:cNvGrpSpPr/>
         <p:nvPr/>
       </p:nvGrpSpPr>
@@ -4249,7 +4249,7 @@
       </p:grpSpPr>
       <p:sp>
         <p:nvSpPr>
-          <p:cNvPr id="347" name="Shape 347"/>
+          <p:cNvPr id="348" name="Shape 348"/>
           <p:cNvSpPr/>
           <p:nvPr>
             <p:ph idx="2" type="sldImg"/>
@@ -4283,7 +4283,7 @@
       </p:sp>
       <p:sp>
         <p:nvSpPr>
-          <p:cNvPr id="348" name="Shape 348"/>
+          <p:cNvPr id="349" name="Shape 349"/>
           <p:cNvSpPr txBox="1"/>
           <p:nvPr>
             <p:ph idx="1" type="body"/>
@@ -4330,7 +4330,7 @@
   <p:cSld>
     <p:spTree>
       <p:nvGrpSpPr>
-        <p:cNvPr id="351" name="Shape 351"/>
+        <p:cNvPr id="352" name="Shape 352"/>
         <p:cNvGrpSpPr/>
         <p:nvPr/>
       </p:nvGrpSpPr>
@@ -4344,7 +4344,7 @@
       </p:grpSpPr>
       <p:sp>
         <p:nvSpPr>
-          <p:cNvPr id="352" name="Shape 352"/>
+          <p:cNvPr id="353" name="Shape 353"/>
           <p:cNvSpPr/>
           <p:nvPr>
             <p:ph idx="2" type="sldImg"/>
@@ -4378,7 +4378,7 @@
       </p:sp>
       <p:sp>
         <p:nvSpPr>
-          <p:cNvPr id="353" name="Shape 353"/>
+          <p:cNvPr id="354" name="Shape 354"/>
           <p:cNvSpPr txBox="1"/>
           <p:nvPr>
             <p:ph idx="1" type="body"/>
@@ -4425,7 +4425,7 @@
   <p:cSld>
     <p:spTree>
       <p:nvGrpSpPr>
-        <p:cNvPr id="358" name="Shape 358"/>
+        <p:cNvPr id="359" name="Shape 359"/>
         <p:cNvGrpSpPr/>
         <p:nvPr/>
       </p:nvGrpSpPr>
@@ -4439,7 +4439,7 @@
       </p:grpSpPr>
       <p:sp>
         <p:nvSpPr>
-          <p:cNvPr id="359" name="Shape 359"/>
+          <p:cNvPr id="360" name="Shape 360"/>
           <p:cNvSpPr/>
           <p:nvPr>
             <p:ph idx="2" type="sldImg"/>
@@ -4473,7 +4473,7 @@
       </p:sp>
       <p:sp>
         <p:nvSpPr>
-          <p:cNvPr id="360" name="Shape 360"/>
+          <p:cNvPr id="361" name="Shape 361"/>
           <p:cNvSpPr txBox="1"/>
           <p:nvPr>
             <p:ph idx="1" type="body"/>
@@ -4520,7 +4520,7 @@
   <p:cSld>
     <p:spTree>
       <p:nvGrpSpPr>
-        <p:cNvPr id="364" name="Shape 364"/>
+        <p:cNvPr id="365" name="Shape 365"/>
         <p:cNvGrpSpPr/>
         <p:nvPr/>
       </p:nvGrpSpPr>
@@ -4534,7 +4534,7 @@
       </p:grpSpPr>
       <p:sp>
         <p:nvSpPr>
-          <p:cNvPr id="365" name="Shape 365"/>
+          <p:cNvPr id="366" name="Shape 366"/>
           <p:cNvSpPr/>
           <p:nvPr>
             <p:ph idx="2" type="sldImg"/>
@@ -4568,7 +4568,7 @@
       </p:sp>
       <p:sp>
         <p:nvSpPr>
-          <p:cNvPr id="366" name="Shape 366"/>
+          <p:cNvPr id="367" name="Shape 367"/>
           <p:cNvSpPr txBox="1"/>
           <p:nvPr>
             <p:ph idx="1" type="body"/>
@@ -11664,7 +11664,7 @@
             <a:tbl>
               <a:tblPr>
                 <a:noFill/>
-                <a:tableStyleId>{373E8E48-A7D8-46AE-BCE2-A255D18B4CD9}</a:tableStyleId>
+                <a:tableStyleId>{8A7A89EA-3B2D-496D-B082-78B8A0A801F4}</a:tableStyleId>
               </a:tblPr>
               <a:tblGrid>
                 <a:gridCol w="2137575"/>
@@ -13648,6 +13648,26 @@
                 <a:cs typeface="Courier New"/>
                 <a:sym typeface="Courier New"/>
               </a:rPr>
+              <a:t>js hungerBar = 0</a:t>
+            </a:r>
+          </a:p>
+          <a:p>
+            <a:pPr lvl="0" rtl="0">
+              <a:spcBef>
+                <a:spcPts val="0"/>
+              </a:spcBef>
+              <a:buNone/>
+            </a:pPr>
+            <a:r>
+              <a:rPr b="1" lang="en">
+                <a:solidFill>
+                  <a:srgbClr val="FF0000"/>
+                </a:solidFill>
+                <a:latin typeface="Courier New"/>
+                <a:ea typeface="Courier New"/>
+                <a:cs typeface="Courier New"/>
+                <a:sym typeface="Courier New"/>
+              </a:rPr>
               <a:t>js hungerBar = hungerBar + 1</a:t>
             </a:r>
           </a:p>
@@ -16191,7 +16211,7 @@
                 <a:cs typeface="Courier New"/>
                 <a:sym typeface="Courier New"/>
               </a:rPr>
-              <a:t>exports.helloWorld = helloWorld();</a:t>
+              <a:t>exports.helloWorld = helloWorld;</a:t>
             </a:r>
           </a:p>
           <a:p>
@@ -17343,7 +17363,23 @@
             </a:r>
             <a:r>
               <a:rPr lang="en"/>
-              <a:t>to add the changes on the right, refresh, and try it out:</a:t>
+              <a:t>to add the changes on the </a:t>
+            </a:r>
+            <a:r>
+              <a:rPr b="1" i="1" lang="en"/>
+              <a:t>right</a:t>
+            </a:r>
+            <a:r>
+              <a:rPr lang="en"/>
+              <a:t>, refresh, and try it out using the code </a:t>
+            </a:r>
+            <a:r>
+              <a:rPr b="1" i="1" lang="en"/>
+              <a:t>below</a:t>
+            </a:r>
+            <a:r>
+              <a:rPr lang="en"/>
+              <a:t>:</a:t>
             </a:r>
           </a:p>
           <a:p>
@@ -18064,13 +18100,13 @@
           <p:cNvPr id="308" name="Shape 308"/>
           <p:cNvSpPr txBox="1"/>
           <p:nvPr>
-            <p:ph type="title"/>
+            <p:ph idx="4294967295" type="title"/>
           </p:nvPr>
         </p:nvSpPr>
         <p:spPr>
           <a:xfrm>
-            <a:off x="0" y="418350"/>
-            <a:ext cx="5169600" cy="4306800"/>
+            <a:off x="303300" y="411575"/>
+            <a:ext cx="8520600" cy="639600"/>
           </a:xfrm>
           <a:prstGeom prst="rect">
             <a:avLst/>
@@ -18315,7 +18351,7 @@
           <p:cNvPr id="309" name="Shape 309"/>
           <p:cNvSpPr txBox="1"/>
           <p:nvPr>
-            <p:ph type="title"/>
+            <p:ph idx="4294967295" type="title"/>
           </p:nvPr>
         </p:nvSpPr>
         <p:spPr>
@@ -18491,6 +18527,42 @@
                 <a:sym typeface="Courier New"/>
               </a:rPr>
               <a:t>exports.roll = roll;</a:t>
+            </a:r>
+          </a:p>
+        </p:txBody>
+      </p:sp>
+      <p:sp>
+        <p:nvSpPr>
+          <p:cNvPr id="310" name="Shape 310"/>
+          <p:cNvSpPr txBox="1"/>
+          <p:nvPr>
+            <p:ph idx="1" type="body"/>
+          </p:nvPr>
+        </p:nvSpPr>
+        <p:spPr>
+          <a:xfrm>
+            <a:off x="328017" y="4226025"/>
+            <a:ext cx="8388600" cy="393600"/>
+          </a:xfrm>
+          <a:prstGeom prst="rect">
+            <a:avLst/>
+          </a:prstGeom>
+        </p:spPr>
+        <p:txBody>
+          <a:bodyPr anchorCtr="0" anchor="ctr" bIns="91425" lIns="91425" rIns="91425" tIns="91425">
+            <a:noAutofit/>
+          </a:bodyPr>
+          <a:lstStyle/>
+          <a:p>
+            <a:pPr lvl="0">
+              <a:spcBef>
+                <a:spcPts val="0"/>
+              </a:spcBef>
+              <a:buNone/>
+            </a:pPr>
+            <a:r>
+              <a:rPr lang="en"/>
+              <a:t>Example of Using Conditionals to Make the Dice Roll Better</a:t>
             </a:r>
           </a:p>
         </p:txBody>
@@ -18599,7 +18671,7 @@
     </p:bg>
     <p:spTree>
       <p:nvGrpSpPr>
-        <p:cNvPr id="313" name="Shape 313"/>
+        <p:cNvPr id="314" name="Shape 314"/>
         <p:cNvGrpSpPr/>
         <p:nvPr/>
       </p:nvGrpSpPr>
@@ -18613,7 +18685,7 @@
       </p:grpSpPr>
       <p:sp>
         <p:nvSpPr>
-          <p:cNvPr id="314" name="Shape 314"/>
+          <p:cNvPr id="315" name="Shape 315"/>
           <p:cNvSpPr txBox="1"/>
           <p:nvPr>
             <p:ph type="title"/>
@@ -18675,7 +18747,7 @@
     </p:bg>
     <p:spTree>
       <p:nvGrpSpPr>
-        <p:cNvPr id="318" name="Shape 318"/>
+        <p:cNvPr id="319" name="Shape 319"/>
         <p:cNvGrpSpPr/>
         <p:nvPr/>
       </p:nvGrpSpPr>
@@ -18689,7 +18761,7 @@
       </p:grpSpPr>
       <p:sp>
         <p:nvSpPr>
-          <p:cNvPr id="319" name="Shape 319"/>
+          <p:cNvPr id="320" name="Shape 320"/>
           <p:cNvSpPr txBox="1"/>
           <p:nvPr>
             <p:ph type="title"/>
@@ -18725,7 +18797,7 @@
       </p:sp>
       <p:sp>
         <p:nvSpPr>
-          <p:cNvPr id="320" name="Shape 320"/>
+          <p:cNvPr id="321" name="Shape 321"/>
           <p:cNvSpPr txBox="1"/>
           <p:nvPr>
             <p:ph idx="1" type="body"/>
@@ -18733,8 +18805,8 @@
         </p:nvSpPr>
         <p:spPr>
           <a:xfrm>
-            <a:off x="1523850" y="1519575"/>
-            <a:ext cx="7584600" cy="3364800"/>
+            <a:off x="1084200" y="1443375"/>
+            <a:ext cx="8060100" cy="3364800"/>
           </a:xfrm>
           <a:prstGeom prst="rect">
             <a:avLst/>
@@ -18778,7 +18850,7 @@
                 <a:cs typeface="Courier New"/>
                 <a:sym typeface="Courier New"/>
               </a:rPr>
-              <a:t>var farmAnimals = [ 'Sheep','Cow','Pig','Chicken' ];</a:t>
+              <a:t>js var farmAnimals = [ 'Sheep','Cow','Pig','Chicken' ];</a:t>
             </a:r>
           </a:p>
           <a:p>
@@ -18810,7 +18882,7 @@
                 <a:cs typeface="Courier New"/>
                 <a:sym typeface="Courier New"/>
               </a:rPr>
-              <a:t>echo(farmAnimals[0]); echo(farmAnimals[1]); echo(farmAnimals[2]);</a:t>
+              <a:t>js echo(farmAnimals[0]); echo(farmAnimals[1]); echo(farmAnimals[2]);</a:t>
             </a:r>
           </a:p>
           <a:p>
@@ -18830,7 +18902,7 @@
                 <a:cs typeface="Courier New"/>
                 <a:sym typeface="Courier New"/>
               </a:rPr>
-              <a:t>for (var count in farmAnimals) { echo(farmAnimals[count]); }</a:t>
+              <a:t>js for (var count in farmAnimals) { echo(farmAnimals[count]); }</a:t>
             </a:r>
           </a:p>
           <a:p>
@@ -18867,7 +18939,7 @@
                 <a:cs typeface="Courier New"/>
                 <a:sym typeface="Courier New"/>
               </a:rPr>
-              <a:t>echo(farmAnimals[0]);</a:t>
+              <a:t>echo(farmAnimals[5]);</a:t>
             </a:r>
           </a:p>
           <a:p>
@@ -18916,7 +18988,7 @@
     </p:bg>
     <p:spTree>
       <p:nvGrpSpPr>
-        <p:cNvPr id="324" name="Shape 324"/>
+        <p:cNvPr id="325" name="Shape 325"/>
         <p:cNvGrpSpPr/>
         <p:nvPr/>
       </p:nvGrpSpPr>
@@ -18930,7 +19002,7 @@
       </p:grpSpPr>
       <p:sp>
         <p:nvSpPr>
-          <p:cNvPr id="325" name="Shape 325"/>
+          <p:cNvPr id="326" name="Shape 326"/>
           <p:cNvSpPr txBox="1"/>
           <p:nvPr>
             <p:ph type="title"/>
@@ -18966,7 +19038,7 @@
       </p:sp>
       <p:sp>
         <p:nvSpPr>
-          <p:cNvPr id="326" name="Shape 326"/>
+          <p:cNvPr id="327" name="Shape 327"/>
           <p:cNvSpPr txBox="1"/>
           <p:nvPr>
             <p:ph idx="1" type="body"/>
@@ -19140,7 +19212,7 @@
     </p:bg>
     <p:spTree>
       <p:nvGrpSpPr>
-        <p:cNvPr id="330" name="Shape 330"/>
+        <p:cNvPr id="331" name="Shape 331"/>
         <p:cNvGrpSpPr/>
         <p:nvPr/>
       </p:nvGrpSpPr>
@@ -19154,7 +19226,7 @@
       </p:grpSpPr>
       <p:sp>
         <p:nvSpPr>
-          <p:cNvPr id="331" name="Shape 331"/>
+          <p:cNvPr id="332" name="Shape 332"/>
           <p:cNvSpPr txBox="1"/>
           <p:nvPr>
             <p:ph type="title"/>
@@ -19190,7 +19262,7 @@
       </p:sp>
       <p:sp>
         <p:nvSpPr>
-          <p:cNvPr id="332" name="Shape 332"/>
+          <p:cNvPr id="333" name="Shape 333"/>
           <p:cNvSpPr txBox="1"/>
           <p:nvPr>
             <p:ph idx="1" type="body"/>
@@ -19714,7 +19786,7 @@
     </p:bg>
     <p:spTree>
       <p:nvGrpSpPr>
-        <p:cNvPr id="336" name="Shape 336"/>
+        <p:cNvPr id="337" name="Shape 337"/>
         <p:cNvGrpSpPr/>
         <p:nvPr/>
       </p:nvGrpSpPr>
@@ -19728,7 +19800,7 @@
       </p:grpSpPr>
       <p:sp>
         <p:nvSpPr>
-          <p:cNvPr id="337" name="Shape 337"/>
+          <p:cNvPr id="338" name="Shape 338"/>
           <p:cNvSpPr txBox="1"/>
           <p:nvPr>
             <p:ph type="title"/>
@@ -19764,7 +19836,7 @@
       </p:sp>
       <p:sp>
         <p:nvSpPr>
-          <p:cNvPr id="338" name="Shape 338"/>
+          <p:cNvPr id="339" name="Shape 339"/>
           <p:cNvSpPr txBox="1"/>
           <p:nvPr>
             <p:ph idx="1" type="body"/>
@@ -19968,7 +20040,7 @@
       </p:sp>
       <p:sp>
         <p:nvSpPr>
-          <p:cNvPr id="339" name="Shape 339"/>
+          <p:cNvPr id="340" name="Shape 340"/>
           <p:cNvSpPr txBox="1"/>
           <p:nvPr>
             <p:ph idx="2" type="body"/>
@@ -20198,7 +20270,7 @@
     </p:bg>
     <p:spTree>
       <p:nvGrpSpPr>
-        <p:cNvPr id="343" name="Shape 343"/>
+        <p:cNvPr id="344" name="Shape 344"/>
         <p:cNvGrpSpPr/>
         <p:nvPr/>
       </p:nvGrpSpPr>
@@ -20212,7 +20284,7 @@
       </p:grpSpPr>
       <p:sp>
         <p:nvSpPr>
-          <p:cNvPr id="344" name="Shape 344"/>
+          <p:cNvPr id="345" name="Shape 345"/>
           <p:cNvSpPr txBox="1"/>
           <p:nvPr>
             <p:ph type="title"/>
@@ -20248,7 +20320,7 @@
       </p:sp>
       <p:sp>
         <p:nvSpPr>
-          <p:cNvPr id="345" name="Shape 345"/>
+          <p:cNvPr id="346" name="Shape 346"/>
           <p:cNvSpPr txBox="1"/>
           <p:nvPr>
             <p:ph idx="1" type="body"/>
@@ -20712,7 +20784,7 @@
     </p:bg>
     <p:spTree>
       <p:nvGrpSpPr>
-        <p:cNvPr id="349" name="Shape 349"/>
+        <p:cNvPr id="350" name="Shape 350"/>
         <p:cNvGrpSpPr/>
         <p:nvPr/>
       </p:nvGrpSpPr>
@@ -20726,7 +20798,7 @@
       </p:grpSpPr>
       <p:sp>
         <p:nvSpPr>
-          <p:cNvPr id="350" name="Shape 350"/>
+          <p:cNvPr id="351" name="Shape 351"/>
           <p:cNvSpPr txBox="1"/>
           <p:nvPr>
             <p:ph type="title"/>
@@ -20788,7 +20860,7 @@
     </p:bg>
     <p:spTree>
       <p:nvGrpSpPr>
-        <p:cNvPr id="354" name="Shape 354"/>
+        <p:cNvPr id="355" name="Shape 355"/>
         <p:cNvGrpSpPr/>
         <p:nvPr/>
       </p:nvGrpSpPr>
@@ -20802,7 +20874,7 @@
       </p:grpSpPr>
       <p:sp>
         <p:nvSpPr>
-          <p:cNvPr id="355" name="Shape 355"/>
+          <p:cNvPr id="356" name="Shape 356"/>
           <p:cNvSpPr txBox="1"/>
           <p:nvPr>
             <p:ph type="title"/>
@@ -20838,7 +20910,7 @@
       </p:sp>
       <p:sp>
         <p:nvSpPr>
-          <p:cNvPr id="356" name="Shape 356"/>
+          <p:cNvPr id="357" name="Shape 357"/>
           <p:cNvSpPr txBox="1"/>
           <p:nvPr>
             <p:ph idx="1" type="body"/>
@@ -21006,7 +21078,7 @@
       </p:sp>
       <p:sp>
         <p:nvSpPr>
-          <p:cNvPr id="357" name="Shape 357"/>
+          <p:cNvPr id="358" name="Shape 358"/>
           <p:cNvSpPr txBox="1"/>
           <p:nvPr>
             <p:ph idx="2" type="body"/>
@@ -21456,7 +21528,7 @@
     </p:bg>
     <p:spTree>
       <p:nvGrpSpPr>
-        <p:cNvPr id="361" name="Shape 361"/>
+        <p:cNvPr id="362" name="Shape 362"/>
         <p:cNvGrpSpPr/>
         <p:nvPr/>
       </p:nvGrpSpPr>
@@ -21470,7 +21542,7 @@
       </p:grpSpPr>
       <p:sp>
         <p:nvSpPr>
-          <p:cNvPr id="362" name="Shape 362"/>
+          <p:cNvPr id="363" name="Shape 363"/>
           <p:cNvSpPr txBox="1"/>
           <p:nvPr>
             <p:ph type="title"/>
@@ -21506,7 +21578,7 @@
       </p:sp>
       <p:sp>
         <p:nvSpPr>
-          <p:cNvPr id="363" name="Shape 363"/>
+          <p:cNvPr id="364" name="Shape 364"/>
           <p:cNvSpPr txBox="1"/>
           <p:nvPr>
             <p:ph idx="1" type="body"/>
@@ -21825,7 +21897,7 @@
     </p:bg>
     <p:spTree>
       <p:nvGrpSpPr>
-        <p:cNvPr id="367" name="Shape 367"/>
+        <p:cNvPr id="368" name="Shape 368"/>
         <p:cNvGrpSpPr/>
         <p:nvPr/>
       </p:nvGrpSpPr>
@@ -21839,7 +21911,7 @@
       </p:grpSpPr>
       <p:sp>
         <p:nvSpPr>
-          <p:cNvPr id="368" name="Shape 368"/>
+          <p:cNvPr id="369" name="Shape 369"/>
           <p:cNvSpPr txBox="1"/>
           <p:nvPr>
             <p:ph type="title"/>
@@ -21875,7 +21947,7 @@
       </p:sp>
       <p:sp>
         <p:nvSpPr>
-          <p:cNvPr id="369" name="Shape 369"/>
+          <p:cNvPr id="370" name="Shape 370"/>
           <p:cNvSpPr txBox="1"/>
           <p:nvPr>
             <p:ph idx="1" type="body"/>

</xml_diff>

<commit_message>
Fixed typo on dice slide that assumes it is already a module. Use new cmLocation(...) to avoid the "not a function" error
</commit_message>
<xml_diff>
--- a/slides/ScriptCraft- Day 01 (Getting Started).pptx
+++ b/slides/ScriptCraft- Day 01 (Getting Started).pptx
@@ -11664,7 +11664,7 @@
             <a:tbl>
               <a:tblPr>
                 <a:noFill/>
-                <a:tableStyleId>{8A7A89EA-3B2D-496D-B082-78B8A0A801F4}</a:tableStyleId>
+                <a:tableStyleId>{8C6DD40B-30F2-42AD-95B6-A37B6FA4A88F}</a:tableStyleId>
               </a:tblPr>
               <a:tblGrid>
                 <a:gridCol w="2137575"/>
@@ -17387,6 +17387,26 @@
               <a:spcBef>
                 <a:spcPts val="0"/>
               </a:spcBef>
+              <a:buNone/>
+            </a:pPr>
+            <a:r>
+              <a:rPr b="1" lang="en">
+                <a:solidFill>
+                  <a:srgbClr val="FF0000"/>
+                </a:solidFill>
+                <a:latin typeface="Courier New"/>
+                <a:ea typeface="Courier New"/>
+                <a:cs typeface="Courier New"/>
+                <a:sym typeface="Courier New"/>
+              </a:rPr>
+              <a:t>js roll(6)</a:t>
+            </a:r>
+          </a:p>
+          <a:p>
+            <a:pPr lvl="0" rtl="0">
+              <a:spcBef>
+                <a:spcPts val="0"/>
+              </a:spcBef>
               <a:buClr>
                 <a:schemeClr val="dk2"/>
               </a:buClr>
@@ -17404,52 +17424,7 @@
                 <a:cs typeface="Courier New"/>
                 <a:sym typeface="Courier New"/>
               </a:rPr>
-              <a:t>js var dice = require("dice")</a:t>
-            </a:r>
-          </a:p>
-          <a:p>
-            <a:pPr lvl="0" rtl="0">
-              <a:spcBef>
-                <a:spcPts val="0"/>
-              </a:spcBef>
-              <a:buNone/>
-            </a:pPr>
-            <a:r>
-              <a:rPr b="1" lang="en">
-                <a:solidFill>
-                  <a:srgbClr val="FF0000"/>
-                </a:solidFill>
-                <a:latin typeface="Courier New"/>
-                <a:ea typeface="Courier New"/>
-                <a:cs typeface="Courier New"/>
-                <a:sym typeface="Courier New"/>
-              </a:rPr>
-              <a:t>js dice.roll(6)</a:t>
-            </a:r>
-          </a:p>
-          <a:p>
-            <a:pPr lvl="0" rtl="0">
-              <a:spcBef>
-                <a:spcPts val="0"/>
-              </a:spcBef>
-              <a:buClr>
-                <a:schemeClr val="dk2"/>
-              </a:buClr>
-              <a:buSzPct val="78571"/>
-              <a:buFont typeface="Arial"/>
-              <a:buNone/>
-            </a:pPr>
-            <a:r>
-              <a:rPr b="1" lang="en">
-                <a:solidFill>
-                  <a:srgbClr val="FF0000"/>
-                </a:solidFill>
-                <a:latin typeface="Courier New"/>
-                <a:ea typeface="Courier New"/>
-                <a:cs typeface="Courier New"/>
-                <a:sym typeface="Courier New"/>
-              </a:rPr>
-              <a:t>js dice.roll(20)</a:t>
+              <a:t>js roll(20)</a:t>
             </a:r>
           </a:p>
         </p:txBody>
@@ -18183,7 +18158,7 @@
                 <a:cs typeface="Courier New"/>
                 <a:sym typeface="Courier New"/>
               </a:rPr>
-              <a:t>    throw("Negative numbers not valid");</a:t>
+              <a:t>    echo("Negative numbers not valid");</a:t>
             </a:r>
           </a:p>
           <a:p>
@@ -18275,7 +18250,7 @@
                 <a:cs typeface="Courier New"/>
                 <a:sym typeface="Courier New"/>
               </a:rPr>
-              <a:t>    throw("Not a number");</a:t>
+              <a:t>    echo("Not a number");</a:t>
             </a:r>
           </a:p>
           <a:p>
@@ -18939,7 +18914,7 @@
                 <a:cs typeface="Courier New"/>
                 <a:sym typeface="Courier New"/>
               </a:rPr>
-              <a:t>echo(farmAnimals[5]);</a:t>
+              <a:t>js echo(farmAnimals[5]);</a:t>
             </a:r>
           </a:p>
           <a:p>

</xml_diff>